<commit_message>
DG: Update Login and Search Result Implementation
</commit_message>
<xml_diff>
--- a/docs/diagrams/UiComponentClassDiagram.pptx
+++ b/docs/diagrams/UiComponentClassDiagram.pptx
@@ -208,7 +208,7 @@
           <a:p>
             <a:fld id="{F5CC4B3F-88C1-4FFA-B1B6-F41C21DC6924}" type="datetimeFigureOut">
               <a:rPr lang="en-US" smtClean="0"/>
-              <a:t>1/7/2017</a:t>
+              <a:t>10/17/2018</a:t>
             </a:fld>
             <a:endParaRPr lang="en-US"/>
           </a:p>
@@ -654,7 +654,7 @@
           <a:p>
             <a:fld id="{78C97017-6FC3-485B-9764-EAC9E56C1D49}" type="datetimeFigureOut">
               <a:rPr lang="en-US" smtClean="0"/>
-              <a:t>1/7/2017</a:t>
+              <a:t>10/17/2018</a:t>
             </a:fld>
             <a:endParaRPr lang="en-US"/>
           </a:p>
@@ -822,7 +822,7 @@
           <a:p>
             <a:fld id="{78C97017-6FC3-485B-9764-EAC9E56C1D49}" type="datetimeFigureOut">
               <a:rPr lang="en-US" smtClean="0"/>
-              <a:t>1/7/2017</a:t>
+              <a:t>10/17/2018</a:t>
             </a:fld>
             <a:endParaRPr lang="en-US"/>
           </a:p>
@@ -1000,7 +1000,7 @@
           <a:p>
             <a:fld id="{78C97017-6FC3-485B-9764-EAC9E56C1D49}" type="datetimeFigureOut">
               <a:rPr lang="en-US" smtClean="0"/>
-              <a:t>1/7/2017</a:t>
+              <a:t>10/17/2018</a:t>
             </a:fld>
             <a:endParaRPr lang="en-US"/>
           </a:p>
@@ -1168,7 +1168,7 @@
           <a:p>
             <a:fld id="{78C97017-6FC3-485B-9764-EAC9E56C1D49}" type="datetimeFigureOut">
               <a:rPr lang="en-US" smtClean="0"/>
-              <a:t>1/7/2017</a:t>
+              <a:t>10/17/2018</a:t>
             </a:fld>
             <a:endParaRPr lang="en-US"/>
           </a:p>
@@ -1413,7 +1413,7 @@
           <a:p>
             <a:fld id="{78C97017-6FC3-485B-9764-EAC9E56C1D49}" type="datetimeFigureOut">
               <a:rPr lang="en-US" smtClean="0"/>
-              <a:t>1/7/2017</a:t>
+              <a:t>10/17/2018</a:t>
             </a:fld>
             <a:endParaRPr lang="en-US"/>
           </a:p>
@@ -1698,7 +1698,7 @@
           <a:p>
             <a:fld id="{78C97017-6FC3-485B-9764-EAC9E56C1D49}" type="datetimeFigureOut">
               <a:rPr lang="en-US" smtClean="0"/>
-              <a:t>1/7/2017</a:t>
+              <a:t>10/17/2018</a:t>
             </a:fld>
             <a:endParaRPr lang="en-US"/>
           </a:p>
@@ -2117,7 +2117,7 @@
           <a:p>
             <a:fld id="{78C97017-6FC3-485B-9764-EAC9E56C1D49}" type="datetimeFigureOut">
               <a:rPr lang="en-US" smtClean="0"/>
-              <a:t>1/7/2017</a:t>
+              <a:t>10/17/2018</a:t>
             </a:fld>
             <a:endParaRPr lang="en-US"/>
           </a:p>
@@ -2234,7 +2234,7 @@
           <a:p>
             <a:fld id="{78C97017-6FC3-485B-9764-EAC9E56C1D49}" type="datetimeFigureOut">
               <a:rPr lang="en-US" smtClean="0"/>
-              <a:t>1/7/2017</a:t>
+              <a:t>10/17/2018</a:t>
             </a:fld>
             <a:endParaRPr lang="en-US"/>
           </a:p>
@@ -2329,7 +2329,7 @@
           <a:p>
             <a:fld id="{78C97017-6FC3-485B-9764-EAC9E56C1D49}" type="datetimeFigureOut">
               <a:rPr lang="en-US" smtClean="0"/>
-              <a:t>1/7/2017</a:t>
+              <a:t>10/17/2018</a:t>
             </a:fld>
             <a:endParaRPr lang="en-US"/>
           </a:p>
@@ -2604,7 +2604,7 @@
           <a:p>
             <a:fld id="{78C97017-6FC3-485B-9764-EAC9E56C1D49}" type="datetimeFigureOut">
               <a:rPr lang="en-US" smtClean="0"/>
-              <a:t>1/7/2017</a:t>
+              <a:t>10/17/2018</a:t>
             </a:fld>
             <a:endParaRPr lang="en-US"/>
           </a:p>
@@ -2856,7 +2856,7 @@
           <a:p>
             <a:fld id="{78C97017-6FC3-485B-9764-EAC9E56C1D49}" type="datetimeFigureOut">
               <a:rPr lang="en-US" smtClean="0"/>
-              <a:t>1/7/2017</a:t>
+              <a:t>10/17/2018</a:t>
             </a:fld>
             <a:endParaRPr lang="en-US"/>
           </a:p>
@@ -3067,7 +3067,7 @@
           <a:p>
             <a:fld id="{78C97017-6FC3-485B-9764-EAC9E56C1D49}" type="datetimeFigureOut">
               <a:rPr lang="en-US" smtClean="0"/>
-              <a:t>1/7/2017</a:t>
+              <a:t>10/17/2018</a:t>
             </a:fld>
             <a:endParaRPr lang="en-US"/>
           </a:p>
@@ -3450,8 +3450,8 @@
         </p:nvSpPr>
         <p:spPr>
           <a:xfrm>
-            <a:off x="1217465" y="1447800"/>
-            <a:ext cx="4917083" cy="3962400"/>
+            <a:off x="1104452" y="1295411"/>
+            <a:ext cx="5143948" cy="4114789"/>
           </a:xfrm>
           <a:prstGeom prst="roundRect">
             <a:avLst>
@@ -3512,8 +3512,8 @@
         </p:nvSpPr>
         <p:spPr>
           <a:xfrm>
-            <a:off x="2095948" y="2341220"/>
-            <a:ext cx="1093635" cy="346760"/>
+            <a:off x="2096016" y="2652161"/>
+            <a:ext cx="1093635" cy="305468"/>
           </a:xfrm>
           <a:prstGeom prst="rect">
             <a:avLst/>
@@ -3572,7 +3572,7 @@
         </p:nvSpPr>
         <p:spPr>
           <a:xfrm>
-            <a:off x="2592528" y="2971800"/>
+            <a:off x="2592528" y="3268359"/>
             <a:ext cx="1093635" cy="236841"/>
           </a:xfrm>
           <a:prstGeom prst="rect">
@@ -3632,7 +3632,7 @@
         </p:nvSpPr>
         <p:spPr>
           <a:xfrm>
-            <a:off x="2092842" y="1770924"/>
+            <a:off x="2092842" y="1600200"/>
             <a:ext cx="1093635" cy="346760"/>
           </a:xfrm>
           <a:prstGeom prst="rect">
@@ -3687,20 +3687,17 @@
         <p:nvCxnSpPr>
           <p:cNvPr id="10" name="Elbow Connector 63"/>
           <p:cNvCxnSpPr>
-            <a:stCxn id="9" idx="2"/>
-            <a:endCxn id="2" idx="0"/>
+            <a:cxnSpLocks/>
           </p:cNvCxnSpPr>
           <p:nvPr/>
         </p:nvCxnSpPr>
         <p:spPr>
-          <a:xfrm rot="16200000" flipH="1">
-            <a:off x="2529445" y="2227899"/>
-            <a:ext cx="223536" cy="3106"/>
-          </a:xfrm>
-          <a:prstGeom prst="bentConnector3">
-            <a:avLst>
-              <a:gd name="adj1" fmla="val 50000"/>
-            </a:avLst>
+          <a:xfrm flipH="1">
+            <a:off x="2636484" y="1940346"/>
+            <a:ext cx="6350" cy="192992"/>
+          </a:xfrm>
+          <a:prstGeom prst="straightConnector1">
+            <a:avLst/>
           </a:prstGeom>
           <a:ln w="19050">
             <a:solidFill>
@@ -3825,7 +3822,7 @@
         </p:nvSpPr>
         <p:spPr>
           <a:xfrm rot="16200000">
-            <a:off x="5703829" y="2464877"/>
+            <a:off x="5703829" y="2312479"/>
             <a:ext cx="2362201" cy="328045"/>
           </a:xfrm>
           <a:prstGeom prst="roundRect">
@@ -3885,7 +3882,7 @@
         </p:nvSpPr>
         <p:spPr>
           <a:xfrm>
-            <a:off x="2592528" y="3649359"/>
+            <a:off x="2592528" y="3954159"/>
             <a:ext cx="1093635" cy="236841"/>
           </a:xfrm>
           <a:prstGeom prst="rect">
@@ -3945,7 +3942,7 @@
         </p:nvSpPr>
         <p:spPr>
           <a:xfrm>
-            <a:off x="2592527" y="4563759"/>
+            <a:off x="2592527" y="4792359"/>
             <a:ext cx="1093635" cy="236841"/>
           </a:xfrm>
           <a:prstGeom prst="rect">
@@ -4005,7 +4002,7 @@
         </p:nvSpPr>
         <p:spPr>
           <a:xfrm>
-            <a:off x="2592526" y="3991960"/>
+            <a:off x="2592526" y="4294452"/>
             <a:ext cx="1093635" cy="236841"/>
           </a:xfrm>
           <a:prstGeom prst="rect">
@@ -4065,7 +4062,7 @@
         </p:nvSpPr>
         <p:spPr>
           <a:xfrm>
-            <a:off x="3839323" y="4228801"/>
+            <a:off x="3839323" y="4531293"/>
             <a:ext cx="1040906" cy="236841"/>
           </a:xfrm>
           <a:prstGeom prst="rect">
@@ -4125,7 +4122,7 @@
         </p:nvSpPr>
         <p:spPr>
           <a:xfrm>
-            <a:off x="2592528" y="4966000"/>
+            <a:off x="2592528" y="5097159"/>
             <a:ext cx="1093635" cy="236841"/>
           </a:xfrm>
           <a:prstGeom prst="rect">
@@ -4185,7 +4182,7 @@
         </p:nvSpPr>
         <p:spPr>
           <a:xfrm>
-            <a:off x="2324548" y="2706452"/>
+            <a:off x="2317795" y="2987730"/>
             <a:ext cx="183156" cy="161573"/>
           </a:xfrm>
           <a:prstGeom prst="flowChartDecision">
@@ -4236,8 +4233,8 @@
         </p:nvCxnSpPr>
         <p:spPr>
           <a:xfrm rot="16200000" flipH="1">
-            <a:off x="2393229" y="2890922"/>
-            <a:ext cx="222196" cy="176402"/>
+            <a:off x="2382212" y="3176463"/>
+            <a:ext cx="237477" cy="183155"/>
           </a:xfrm>
           <a:prstGeom prst="bentConnector2">
             <a:avLst/>
@@ -4274,7 +4271,7 @@
         </p:nvSpPr>
         <p:spPr>
           <a:xfrm>
-            <a:off x="2590799" y="3304308"/>
+            <a:off x="2590800" y="3573159"/>
             <a:ext cx="1095361" cy="236841"/>
           </a:xfrm>
           <a:prstGeom prst="rect">
@@ -4337,8 +4334,8 @@
         </p:nvCxnSpPr>
         <p:spPr>
           <a:xfrm rot="16200000" flipH="1">
-            <a:off x="2054450" y="3229701"/>
-            <a:ext cx="899755" cy="176402"/>
+            <a:off x="2039312" y="3519363"/>
+            <a:ext cx="923277" cy="183155"/>
           </a:xfrm>
           <a:prstGeom prst="bentConnector2">
             <a:avLst/>
@@ -4378,8 +4375,8 @@
         </p:nvCxnSpPr>
         <p:spPr>
           <a:xfrm rot="16200000" flipH="1">
-            <a:off x="1883148" y="3401003"/>
-            <a:ext cx="1242356" cy="176400"/>
+            <a:off x="1869164" y="3689511"/>
+            <a:ext cx="1263570" cy="183153"/>
           </a:xfrm>
           <a:prstGeom prst="bentConnector2">
             <a:avLst/>
@@ -4419,8 +4416,8 @@
         </p:nvCxnSpPr>
         <p:spPr>
           <a:xfrm rot="16200000" flipH="1">
-            <a:off x="1597249" y="3686901"/>
-            <a:ext cx="1814155" cy="176401"/>
+            <a:off x="1620212" y="3938464"/>
+            <a:ext cx="1761477" cy="183154"/>
           </a:xfrm>
           <a:prstGeom prst="bentConnector2">
             <a:avLst/>
@@ -4453,17 +4450,19 @@
         <p:nvCxnSpPr>
           <p:cNvPr id="53" name="Elbow Connector 63"/>
           <p:cNvCxnSpPr>
-            <a:endCxn id="38" idx="1"/>
+            <a:cxnSpLocks/>
           </p:cNvCxnSpPr>
           <p:nvPr/>
         </p:nvCxnSpPr>
         <p:spPr>
           <a:xfrm rot="16200000" flipH="1">
-            <a:off x="1184119" y="3676012"/>
-            <a:ext cx="2396440" cy="420377"/>
-          </a:xfrm>
-          <a:prstGeom prst="bentConnector2">
-            <a:avLst/>
+            <a:off x="1252941" y="3875994"/>
+            <a:ext cx="2252952" cy="426233"/>
+          </a:xfrm>
+          <a:prstGeom prst="bentConnector3">
+            <a:avLst>
+              <a:gd name="adj1" fmla="val 100003"/>
+            </a:avLst>
           </a:prstGeom>
           <a:ln w="19050">
             <a:solidFill>
@@ -4579,8 +4578,8 @@
         </p:nvCxnSpPr>
         <p:spPr>
           <a:xfrm flipV="1">
-            <a:off x="3686160" y="2286000"/>
-            <a:ext cx="1843809" cy="1136729"/>
+            <a:off x="3686161" y="2286000"/>
+            <a:ext cx="1843808" cy="1405580"/>
           </a:xfrm>
           <a:prstGeom prst="bentConnector2">
             <a:avLst/>
@@ -4620,8 +4619,8 @@
         </p:nvCxnSpPr>
         <p:spPr>
           <a:xfrm rot="5400000">
-            <a:off x="4174488" y="2991741"/>
-            <a:ext cx="2061222" cy="649740"/>
+            <a:off x="4023242" y="3142987"/>
+            <a:ext cx="2363714" cy="649740"/>
           </a:xfrm>
           <a:prstGeom prst="bentConnector2">
             <a:avLst/>
@@ -4661,8 +4660,8 @@
         </p:nvCxnSpPr>
         <p:spPr>
           <a:xfrm rot="5400000">
-            <a:off x="3867176" y="2104987"/>
-            <a:ext cx="1481780" cy="1843806"/>
+            <a:off x="3714776" y="2257387"/>
+            <a:ext cx="1786580" cy="1843806"/>
           </a:xfrm>
           <a:prstGeom prst="bentConnector2">
             <a:avLst/>
@@ -4695,6 +4694,7 @@
         <p:nvCxnSpPr>
           <p:cNvPr id="88" name="Elbow Connector 63"/>
           <p:cNvCxnSpPr>
+            <a:cxnSpLocks/>
             <a:stCxn id="2" idx="3"/>
             <a:endCxn id="16" idx="3"/>
           </p:cNvCxnSpPr>
@@ -4702,8 +4702,8 @@
         </p:nvCxnSpPr>
         <p:spPr>
           <a:xfrm flipV="1">
-            <a:off x="3189583" y="2286000"/>
-            <a:ext cx="2340386" cy="228600"/>
+            <a:off x="3189651" y="2286000"/>
+            <a:ext cx="2340318" cy="518895"/>
           </a:xfrm>
           <a:prstGeom prst="bentConnector2">
             <a:avLst/>
@@ -4743,8 +4743,8 @@
         </p:nvCxnSpPr>
         <p:spPr>
           <a:xfrm rot="5400000">
-            <a:off x="3409976" y="2562187"/>
-            <a:ext cx="2396180" cy="1843807"/>
+            <a:off x="3295676" y="2676487"/>
+            <a:ext cx="2624780" cy="1843807"/>
           </a:xfrm>
           <a:prstGeom prst="bentConnector2">
             <a:avLst/>
@@ -4784,8 +4784,8 @@
         </p:nvCxnSpPr>
         <p:spPr>
           <a:xfrm rot="5400000">
-            <a:off x="3208856" y="2763307"/>
-            <a:ext cx="2798421" cy="1843806"/>
+            <a:off x="3143276" y="2828887"/>
+            <a:ext cx="2929580" cy="1843806"/>
           </a:xfrm>
           <a:prstGeom prst="bentConnector2">
             <a:avLst/>
@@ -4824,7 +4824,7 @@
         </p:nvCxnSpPr>
         <p:spPr>
           <a:xfrm rot="5400000" flipH="1" flipV="1">
-            <a:off x="4594921" y="-355061"/>
+            <a:off x="4594921" y="-525785"/>
             <a:ext cx="170724" cy="4081246"/>
           </a:xfrm>
           <a:prstGeom prst="bentConnector2">
@@ -4863,7 +4863,7 @@
         </p:nvSpPr>
         <p:spPr>
           <a:xfrm rot="16200000">
-            <a:off x="6213739" y="4560376"/>
+            <a:off x="6213739" y="4484176"/>
             <a:ext cx="1371599" cy="328045"/>
           </a:xfrm>
           <a:prstGeom prst="roundRect">
@@ -5044,8 +5044,8 @@
         </p:nvCxnSpPr>
         <p:spPr>
           <a:xfrm rot="10800000" flipV="1">
-            <a:off x="1503020" y="1944303"/>
-            <a:ext cx="589823" cy="341697"/>
+            <a:off x="1503020" y="1773579"/>
+            <a:ext cx="589823" cy="512421"/>
           </a:xfrm>
           <a:prstGeom prst="bentConnector2">
             <a:avLst/>
@@ -5086,8 +5086,8 @@
         </p:nvCxnSpPr>
         <p:spPr>
           <a:xfrm rot="16200000" flipH="1">
-            <a:off x="2226110" y="3058040"/>
-            <a:ext cx="554704" cy="174673"/>
+            <a:off x="2228948" y="3329727"/>
+            <a:ext cx="542277" cy="181427"/>
           </a:xfrm>
           <a:prstGeom prst="bentConnector2">
             <a:avLst/>
@@ -5127,8 +5127,8 @@
         </p:nvCxnSpPr>
         <p:spPr>
           <a:xfrm rot="5400000">
-            <a:off x="4205956" y="1766207"/>
-            <a:ext cx="804221" cy="1843806"/>
+            <a:off x="4057676" y="1914487"/>
+            <a:ext cx="1100780" cy="1843806"/>
           </a:xfrm>
           <a:prstGeom prst="bentConnector2">
             <a:avLst/>
@@ -5168,7 +5168,7 @@
         </p:nvCxnSpPr>
         <p:spPr>
           <a:xfrm rot="16200000" flipH="1">
-            <a:off x="3430123" y="3938021"/>
+            <a:off x="3430123" y="4240513"/>
             <a:ext cx="118421" cy="699979"/>
           </a:xfrm>
           <a:prstGeom prst="bentConnector2">
@@ -5209,8 +5209,8 @@
         </p:nvCxnSpPr>
         <p:spPr>
           <a:xfrm rot="5400000">
-            <a:off x="3695875" y="2276286"/>
-            <a:ext cx="1824381" cy="1843808"/>
+            <a:off x="3544629" y="2427532"/>
+            <a:ext cx="2126873" cy="1843808"/>
           </a:xfrm>
           <a:prstGeom prst="bentConnector2">
             <a:avLst/>
@@ -5300,7 +5300,7 @@
         </p:nvSpPr>
         <p:spPr>
           <a:xfrm>
-            <a:off x="3687515" y="2828802"/>
+            <a:off x="3687515" y="3125361"/>
             <a:ext cx="3048000" cy="203200"/>
           </a:xfrm>
           <a:custGeom>
@@ -5435,7 +5435,7 @@
         </p:nvSpPr>
         <p:spPr>
           <a:xfrm flipV="1">
-            <a:off x="4114799" y="4472708"/>
+            <a:off x="4114799" y="4775200"/>
             <a:ext cx="2642195" cy="101600"/>
           </a:xfrm>
           <a:custGeom>
@@ -5509,6 +5509,116 @@
           </a:p>
         </p:txBody>
       </p:sp>
+      <p:sp>
+        <p:nvSpPr>
+          <p:cNvPr id="87" name="Rectangle 8">
+            <a:extLst>
+              <a:ext uri="{FF2B5EF4-FFF2-40B4-BE49-F238E27FC236}">
+                <a16:creationId xmlns:a16="http://schemas.microsoft.com/office/drawing/2014/main" id="{24880CCB-E642-4202-B3CF-85C742528DE8}"/>
+              </a:ext>
+            </a:extLst>
+          </p:cNvPr>
+          <p:cNvSpPr/>
+          <p:nvPr/>
+        </p:nvSpPr>
+        <p:spPr>
+          <a:xfrm>
+            <a:off x="2092841" y="2134424"/>
+            <a:ext cx="1093635" cy="302608"/>
+          </a:xfrm>
+          <a:prstGeom prst="rect">
+            <a:avLst/>
+          </a:prstGeom>
+          <a:ln w="19050">
+            <a:solidFill>
+              <a:schemeClr val="accent3"/>
+            </a:solidFill>
+          </a:ln>
+          <a:effectLst/>
+        </p:spPr>
+        <p:style>
+          <a:lnRef idx="1">
+            <a:schemeClr val="accent3"/>
+          </a:lnRef>
+          <a:fillRef idx="2">
+            <a:schemeClr val="accent3"/>
+          </a:fillRef>
+          <a:effectRef idx="1">
+            <a:schemeClr val="accent3"/>
+          </a:effectRef>
+          <a:fontRef idx="minor">
+            <a:schemeClr val="dk1"/>
+          </a:fontRef>
+        </p:style>
+        <p:txBody>
+          <a:bodyPr rtlCol="0" anchor="ctr"/>
+          <a:lstStyle/>
+          <a:p>
+            <a:pPr algn="ctr"/>
+            <a:r>
+              <a:rPr lang="en-US" sz="1050" b="1" dirty="0" err="1">
+                <a:solidFill>
+                  <a:schemeClr val="accent3">
+                    <a:lumMod val="75000"/>
+                  </a:schemeClr>
+                </a:solidFill>
+              </a:rPr>
+              <a:t>LoginWindow</a:t>
+            </a:r>
+            <a:endParaRPr lang="en-SG" sz="1050" b="1" dirty="0">
+              <a:solidFill>
+                <a:schemeClr val="accent3">
+                  <a:lumMod val="75000"/>
+                </a:schemeClr>
+              </a:solidFill>
+            </a:endParaRPr>
+          </a:p>
+        </p:txBody>
+      </p:sp>
+      <p:cxnSp>
+        <p:nvCxnSpPr>
+          <p:cNvPr id="122" name="Elbow Connector 63">
+            <a:extLst>
+              <a:ext uri="{FF2B5EF4-FFF2-40B4-BE49-F238E27FC236}">
+                <a16:creationId xmlns:a16="http://schemas.microsoft.com/office/drawing/2014/main" id="{146C8008-98B8-40C0-A90C-D37BA5F28E34}"/>
+              </a:ext>
+            </a:extLst>
+          </p:cNvPr>
+          <p:cNvCxnSpPr>
+            <a:cxnSpLocks/>
+            <a:stCxn id="87" idx="2"/>
+            <a:endCxn id="2" idx="0"/>
+          </p:cNvCxnSpPr>
+          <p:nvPr/>
+        </p:nvCxnSpPr>
+        <p:spPr>
+          <a:xfrm>
+            <a:off x="2639659" y="2437032"/>
+            <a:ext cx="3175" cy="215129"/>
+          </a:xfrm>
+          <a:prstGeom prst="straightConnector1">
+            <a:avLst/>
+          </a:prstGeom>
+          <a:ln w="19050">
+            <a:headEnd type="none" w="med" len="med"/>
+            <a:tailEnd type="arrow" w="med" len="med"/>
+          </a:ln>
+        </p:spPr>
+        <p:style>
+          <a:lnRef idx="1">
+            <a:schemeClr val="accent3"/>
+          </a:lnRef>
+          <a:fillRef idx="0">
+            <a:schemeClr val="accent3"/>
+          </a:fillRef>
+          <a:effectRef idx="0">
+            <a:schemeClr val="accent3"/>
+          </a:effectRef>
+          <a:fontRef idx="minor">
+            <a:schemeClr val="tx1"/>
+          </a:fontRef>
+        </p:style>
+      </p:cxnSp>
     </p:spTree>
     <p:extLst>
       <p:ext uri="{BB962C8B-B14F-4D97-AF65-F5344CB8AC3E}">

</xml_diff>

<commit_message>
Update login window diagrams and prompt text
</commit_message>
<xml_diff>
--- a/docs/diagrams/UiComponentClassDiagram.pptx
+++ b/docs/diagrams/UiComponentClassDiagram.pptx
@@ -208,7 +208,7 @@
           <a:p>
             <a:fld id="{F5CC4B3F-88C1-4FFA-B1B6-F41C21DC6924}" type="datetimeFigureOut">
               <a:rPr lang="en-US" smtClean="0"/>
-              <a:t>10/17/2018</a:t>
+              <a:t>11/1/2018</a:t>
             </a:fld>
             <a:endParaRPr lang="en-US"/>
           </a:p>
@@ -654,7 +654,7 @@
           <a:p>
             <a:fld id="{78C97017-6FC3-485B-9764-EAC9E56C1D49}" type="datetimeFigureOut">
               <a:rPr lang="en-US" smtClean="0"/>
-              <a:t>10/17/2018</a:t>
+              <a:t>11/1/2018</a:t>
             </a:fld>
             <a:endParaRPr lang="en-US"/>
           </a:p>
@@ -822,7 +822,7 @@
           <a:p>
             <a:fld id="{78C97017-6FC3-485B-9764-EAC9E56C1D49}" type="datetimeFigureOut">
               <a:rPr lang="en-US" smtClean="0"/>
-              <a:t>10/17/2018</a:t>
+              <a:t>11/1/2018</a:t>
             </a:fld>
             <a:endParaRPr lang="en-US"/>
           </a:p>
@@ -1000,7 +1000,7 @@
           <a:p>
             <a:fld id="{78C97017-6FC3-485B-9764-EAC9E56C1D49}" type="datetimeFigureOut">
               <a:rPr lang="en-US" smtClean="0"/>
-              <a:t>10/17/2018</a:t>
+              <a:t>11/1/2018</a:t>
             </a:fld>
             <a:endParaRPr lang="en-US"/>
           </a:p>
@@ -1168,7 +1168,7 @@
           <a:p>
             <a:fld id="{78C97017-6FC3-485B-9764-EAC9E56C1D49}" type="datetimeFigureOut">
               <a:rPr lang="en-US" smtClean="0"/>
-              <a:t>10/17/2018</a:t>
+              <a:t>11/1/2018</a:t>
             </a:fld>
             <a:endParaRPr lang="en-US"/>
           </a:p>
@@ -1413,7 +1413,7 @@
           <a:p>
             <a:fld id="{78C97017-6FC3-485B-9764-EAC9E56C1D49}" type="datetimeFigureOut">
               <a:rPr lang="en-US" smtClean="0"/>
-              <a:t>10/17/2018</a:t>
+              <a:t>11/1/2018</a:t>
             </a:fld>
             <a:endParaRPr lang="en-US"/>
           </a:p>
@@ -1698,7 +1698,7 @@
           <a:p>
             <a:fld id="{78C97017-6FC3-485B-9764-EAC9E56C1D49}" type="datetimeFigureOut">
               <a:rPr lang="en-US" smtClean="0"/>
-              <a:t>10/17/2018</a:t>
+              <a:t>11/1/2018</a:t>
             </a:fld>
             <a:endParaRPr lang="en-US"/>
           </a:p>
@@ -2117,7 +2117,7 @@
           <a:p>
             <a:fld id="{78C97017-6FC3-485B-9764-EAC9E56C1D49}" type="datetimeFigureOut">
               <a:rPr lang="en-US" smtClean="0"/>
-              <a:t>10/17/2018</a:t>
+              <a:t>11/1/2018</a:t>
             </a:fld>
             <a:endParaRPr lang="en-US"/>
           </a:p>
@@ -2234,7 +2234,7 @@
           <a:p>
             <a:fld id="{78C97017-6FC3-485B-9764-EAC9E56C1D49}" type="datetimeFigureOut">
               <a:rPr lang="en-US" smtClean="0"/>
-              <a:t>10/17/2018</a:t>
+              <a:t>11/1/2018</a:t>
             </a:fld>
             <a:endParaRPr lang="en-US"/>
           </a:p>
@@ -2329,7 +2329,7 @@
           <a:p>
             <a:fld id="{78C97017-6FC3-485B-9764-EAC9E56C1D49}" type="datetimeFigureOut">
               <a:rPr lang="en-US" smtClean="0"/>
-              <a:t>10/17/2018</a:t>
+              <a:t>11/1/2018</a:t>
             </a:fld>
             <a:endParaRPr lang="en-US"/>
           </a:p>
@@ -2604,7 +2604,7 @@
           <a:p>
             <a:fld id="{78C97017-6FC3-485B-9764-EAC9E56C1D49}" type="datetimeFigureOut">
               <a:rPr lang="en-US" smtClean="0"/>
-              <a:t>10/17/2018</a:t>
+              <a:t>11/1/2018</a:t>
             </a:fld>
             <a:endParaRPr lang="en-US"/>
           </a:p>
@@ -2856,7 +2856,7 @@
           <a:p>
             <a:fld id="{78C97017-6FC3-485B-9764-EAC9E56C1D49}" type="datetimeFigureOut">
               <a:rPr lang="en-US" smtClean="0"/>
-              <a:t>10/17/2018</a:t>
+              <a:t>11/1/2018</a:t>
             </a:fld>
             <a:endParaRPr lang="en-US"/>
           </a:p>
@@ -3067,7 +3067,7 @@
           <a:p>
             <a:fld id="{78C97017-6FC3-485B-9764-EAC9E56C1D49}" type="datetimeFigureOut">
               <a:rPr lang="en-US" smtClean="0"/>
-              <a:t>10/17/2018</a:t>
+              <a:t>11/1/2018</a:t>
             </a:fld>
             <a:endParaRPr lang="en-US"/>
           </a:p>
@@ -3450,8 +3450,8 @@
         </p:nvSpPr>
         <p:spPr>
           <a:xfrm>
-            <a:off x="1104452" y="1295411"/>
-            <a:ext cx="5143948" cy="4114789"/>
+            <a:off x="1104452" y="381000"/>
+            <a:ext cx="5143948" cy="4952990"/>
           </a:xfrm>
           <a:prstGeom prst="roundRect">
             <a:avLst>
@@ -3512,7 +3512,7 @@
         </p:nvSpPr>
         <p:spPr>
           <a:xfrm>
-            <a:off x="2096016" y="2652161"/>
+            <a:off x="2096016" y="1275592"/>
             <a:ext cx="1093635" cy="305468"/>
           </a:xfrm>
           <a:prstGeom prst="rect">
@@ -3572,7 +3572,7 @@
         </p:nvSpPr>
         <p:spPr>
           <a:xfrm>
-            <a:off x="2592528" y="3268359"/>
+            <a:off x="2592528" y="1820558"/>
             <a:ext cx="1093635" cy="236841"/>
           </a:xfrm>
           <a:prstGeom prst="rect">
@@ -3632,7 +3632,7 @@
         </p:nvSpPr>
         <p:spPr>
           <a:xfrm>
-            <a:off x="2092842" y="1600200"/>
+            <a:off x="2092842" y="761999"/>
             <a:ext cx="1093635" cy="346760"/>
           </a:xfrm>
           <a:prstGeom prst="rect">
@@ -3693,7 +3693,7 @@
         </p:nvCxnSpPr>
         <p:spPr>
           <a:xfrm flipH="1">
-            <a:off x="2636484" y="1940346"/>
+            <a:off x="2636484" y="1102145"/>
             <a:ext cx="6350" cy="192992"/>
           </a:xfrm>
           <a:prstGeom prst="straightConnector1">
@@ -3731,7 +3731,7 @@
         </p:nvSpPr>
         <p:spPr>
           <a:xfrm rot="10800000" flipV="1">
-            <a:off x="5394717" y="2110477"/>
+            <a:off x="5394717" y="1101552"/>
             <a:ext cx="270504" cy="175523"/>
           </a:xfrm>
           <a:prstGeom prst="triangle">
@@ -3779,7 +3779,7 @@
         </p:nvCxnSpPr>
         <p:spPr>
           <a:xfrm flipV="1">
-            <a:off x="644735" y="2991937"/>
+            <a:off x="644735" y="2153736"/>
             <a:ext cx="684904" cy="1"/>
           </a:xfrm>
           <a:prstGeom prst="bentConnector3">
@@ -3822,7 +3822,7 @@
         </p:nvSpPr>
         <p:spPr>
           <a:xfrm rot="16200000">
-            <a:off x="5703829" y="2312479"/>
+            <a:off x="5703829" y="1474278"/>
             <a:ext cx="2362201" cy="328045"/>
           </a:xfrm>
           <a:prstGeom prst="roundRect">
@@ -3882,7 +3882,7 @@
         </p:nvSpPr>
         <p:spPr>
           <a:xfrm>
-            <a:off x="2592528" y="3954159"/>
+            <a:off x="2592528" y="2506358"/>
             <a:ext cx="1093635" cy="236841"/>
           </a:xfrm>
           <a:prstGeom prst="rect">
@@ -3936,13 +3936,13 @@
       </p:sp>
       <p:sp>
         <p:nvSpPr>
-          <p:cNvPr id="35" name="Rectangle 11"/>
+          <p:cNvPr id="36" name="Rectangle 11"/>
           <p:cNvSpPr/>
           <p:nvPr/>
         </p:nvSpPr>
         <p:spPr>
           <a:xfrm>
-            <a:off x="2592527" y="4792359"/>
+            <a:off x="2592526" y="2846651"/>
             <a:ext cx="1093635" cy="236841"/>
           </a:xfrm>
           <a:prstGeom prst="rect">
@@ -3982,7 +3982,7 @@
                   </a:schemeClr>
                 </a:solidFill>
               </a:rPr>
-              <a:t>StatusBarFooter</a:t>
+              <a:t>PersonListPanel</a:t>
             </a:r>
             <a:endParaRPr lang="en-SG" sz="1050" b="1" dirty="0">
               <a:solidFill>
@@ -3996,14 +3996,14 @@
       </p:sp>
       <p:sp>
         <p:nvSpPr>
-          <p:cNvPr id="36" name="Rectangle 11"/>
+          <p:cNvPr id="37" name="Rectangle 11"/>
           <p:cNvSpPr/>
           <p:nvPr/>
         </p:nvSpPr>
         <p:spPr>
           <a:xfrm>
-            <a:off x="2592526" y="4294452"/>
-            <a:ext cx="1093635" cy="236841"/>
+            <a:off x="3839323" y="3083492"/>
+            <a:ext cx="1040906" cy="236841"/>
           </a:xfrm>
           <a:prstGeom prst="rect">
             <a:avLst/>
@@ -4042,7 +4042,7 @@
                   </a:schemeClr>
                 </a:solidFill>
               </a:rPr>
-              <a:t>PersonListPanel</a:t>
+              <a:t>PersonCard</a:t>
             </a:r>
             <a:endParaRPr lang="en-SG" sz="1050" b="1" dirty="0">
               <a:solidFill>
@@ -4056,14 +4056,14 @@
       </p:sp>
       <p:sp>
         <p:nvSpPr>
-          <p:cNvPr id="37" name="Rectangle 11"/>
+          <p:cNvPr id="38" name="Rectangle 11"/>
           <p:cNvSpPr/>
           <p:nvPr/>
         </p:nvSpPr>
         <p:spPr>
           <a:xfrm>
-            <a:off x="3839323" y="4531293"/>
-            <a:ext cx="1040906" cy="236841"/>
+            <a:off x="2592528" y="4786176"/>
+            <a:ext cx="1093635" cy="236841"/>
           </a:xfrm>
           <a:prstGeom prst="rect">
             <a:avLst/>
@@ -4102,7 +4102,7 @@
                   </a:schemeClr>
                 </a:solidFill>
               </a:rPr>
-              <a:t>PersonCard</a:t>
+              <a:t>HelpWindow</a:t>
             </a:r>
             <a:endParaRPr lang="en-SG" sz="1050" b="1" dirty="0">
               <a:solidFill>
@@ -4116,73 +4116,13 @@
       </p:sp>
       <p:sp>
         <p:nvSpPr>
-          <p:cNvPr id="38" name="Rectangle 11"/>
-          <p:cNvSpPr/>
-          <p:nvPr/>
-        </p:nvSpPr>
-        <p:spPr>
-          <a:xfrm>
-            <a:off x="2592528" y="5097159"/>
-            <a:ext cx="1093635" cy="236841"/>
-          </a:xfrm>
-          <a:prstGeom prst="rect">
-            <a:avLst/>
-          </a:prstGeom>
-          <a:ln w="19050">
-            <a:solidFill>
-              <a:schemeClr val="accent3"/>
-            </a:solidFill>
-          </a:ln>
-          <a:effectLst/>
-        </p:spPr>
-        <p:style>
-          <a:lnRef idx="1">
-            <a:schemeClr val="accent3"/>
-          </a:lnRef>
-          <a:fillRef idx="2">
-            <a:schemeClr val="accent3"/>
-          </a:fillRef>
-          <a:effectRef idx="1">
-            <a:schemeClr val="accent3"/>
-          </a:effectRef>
-          <a:fontRef idx="minor">
-            <a:schemeClr val="dk1"/>
-          </a:fontRef>
-        </p:style>
-        <p:txBody>
-          <a:bodyPr rtlCol="0" anchor="ctr"/>
-          <a:lstStyle/>
-          <a:p>
-            <a:pPr algn="ctr"/>
-            <a:r>
-              <a:rPr lang="en-US" sz="1050" b="1" dirty="0" err="1">
-                <a:solidFill>
-                  <a:schemeClr val="accent3">
-                    <a:lumMod val="75000"/>
-                  </a:schemeClr>
-                </a:solidFill>
-              </a:rPr>
-              <a:t>HelpWindow</a:t>
-            </a:r>
-            <a:endParaRPr lang="en-SG" sz="1050" b="1" dirty="0">
-              <a:solidFill>
-                <a:schemeClr val="accent3">
-                  <a:lumMod val="75000"/>
-                </a:schemeClr>
-              </a:solidFill>
-            </a:endParaRPr>
-          </a:p>
-        </p:txBody>
-      </p:sp>
-      <p:sp>
-        <p:nvSpPr>
           <p:cNvPr id="39" name="Flowchart: Decision 38"/>
           <p:cNvSpPr/>
           <p:nvPr/>
         </p:nvSpPr>
         <p:spPr>
           <a:xfrm>
-            <a:off x="2317795" y="2987730"/>
+            <a:off x="2317795" y="1600199"/>
             <a:ext cx="183156" cy="161573"/>
           </a:xfrm>
           <a:prstGeom prst="flowChartDecision">
@@ -4233,8 +4173,8 @@
         </p:nvCxnSpPr>
         <p:spPr>
           <a:xfrm rot="16200000" flipH="1">
-            <a:off x="2382212" y="3176463"/>
-            <a:ext cx="237477" cy="183155"/>
+            <a:off x="2412347" y="1758797"/>
+            <a:ext cx="177207" cy="183155"/>
           </a:xfrm>
           <a:prstGeom prst="bentConnector2">
             <a:avLst/>
@@ -4271,7 +4211,7 @@
         </p:nvSpPr>
         <p:spPr>
           <a:xfrm>
-            <a:off x="2590800" y="3573159"/>
+            <a:off x="2590800" y="2125358"/>
             <a:ext cx="1095361" cy="236841"/>
           </a:xfrm>
           <a:prstGeom prst="rect">
@@ -4334,8 +4274,8 @@
         </p:nvCxnSpPr>
         <p:spPr>
           <a:xfrm rot="16200000" flipH="1">
-            <a:off x="2039312" y="3519363"/>
-            <a:ext cx="923277" cy="183155"/>
+            <a:off x="2069447" y="2101697"/>
+            <a:ext cx="863007" cy="183155"/>
           </a:xfrm>
           <a:prstGeom prst="bentConnector2">
             <a:avLst/>
@@ -4375,8 +4315,8 @@
         </p:nvCxnSpPr>
         <p:spPr>
           <a:xfrm rot="16200000" flipH="1">
-            <a:off x="1869164" y="3689511"/>
-            <a:ext cx="1263570" cy="183153"/>
+            <a:off x="1899299" y="2271845"/>
+            <a:ext cx="1203300" cy="183153"/>
           </a:xfrm>
           <a:prstGeom prst="bentConnector2">
             <a:avLst/>
@@ -4409,15 +4349,14 @@
         <p:nvCxnSpPr>
           <p:cNvPr id="50" name="Elbow Connector 63"/>
           <p:cNvCxnSpPr>
-            <a:stCxn id="39" idx="2"/>
-            <a:endCxn id="35" idx="1"/>
+            <a:cxnSpLocks/>
           </p:cNvCxnSpPr>
           <p:nvPr/>
         </p:nvCxnSpPr>
         <p:spPr>
           <a:xfrm rot="16200000" flipH="1">
-            <a:off x="1620212" y="3938464"/>
-            <a:ext cx="1761477" cy="183154"/>
+            <a:off x="1650348" y="2520799"/>
+            <a:ext cx="1701207" cy="183154"/>
           </a:xfrm>
           <a:prstGeom prst="bentConnector2">
             <a:avLst/>
@@ -4451,18 +4390,17 @@
           <p:cNvPr id="53" name="Elbow Connector 63"/>
           <p:cNvCxnSpPr>
             <a:cxnSpLocks/>
+            <a:endCxn id="38" idx="1"/>
           </p:cNvCxnSpPr>
           <p:nvPr/>
         </p:nvCxnSpPr>
         <p:spPr>
           <a:xfrm rot="16200000" flipH="1">
-            <a:off x="1252941" y="3875994"/>
-            <a:ext cx="2252952" cy="426233"/>
-          </a:xfrm>
-          <a:prstGeom prst="bentConnector3">
-            <a:avLst>
-              <a:gd name="adj1" fmla="val 100003"/>
-            </a:avLst>
+            <a:off x="708949" y="3021018"/>
+            <a:ext cx="3323538" cy="443619"/>
+          </a:xfrm>
+          <a:prstGeom prst="bentConnector2">
+            <a:avLst/>
           </a:prstGeom>
           <a:ln w="19050">
             <a:solidFill>
@@ -4496,7 +4434,7 @@
         </p:nvSpPr>
         <p:spPr>
           <a:xfrm>
-            <a:off x="5143948" y="1770924"/>
+            <a:off x="5143948" y="761999"/>
             <a:ext cx="772043" cy="346760"/>
           </a:xfrm>
           <a:prstGeom prst="rect">
@@ -4578,8 +4516,8 @@
         </p:nvCxnSpPr>
         <p:spPr>
           <a:xfrm flipV="1">
-            <a:off x="3686161" y="2286000"/>
-            <a:ext cx="1843808" cy="1405580"/>
+            <a:off x="3686161" y="1277075"/>
+            <a:ext cx="1843808" cy="966704"/>
           </a:xfrm>
           <a:prstGeom prst="bentConnector2">
             <a:avLst/>
@@ -4619,8 +4557,8 @@
         </p:nvCxnSpPr>
         <p:spPr>
           <a:xfrm rot="5400000">
-            <a:off x="4023242" y="3142987"/>
-            <a:ext cx="2363714" cy="649740"/>
+            <a:off x="4242680" y="1914624"/>
+            <a:ext cx="1924838" cy="649740"/>
           </a:xfrm>
           <a:prstGeom prst="bentConnector2">
             <a:avLst/>
@@ -4660,8 +4598,8 @@
         </p:nvCxnSpPr>
         <p:spPr>
           <a:xfrm rot="5400000">
-            <a:off x="3714776" y="2257387"/>
-            <a:ext cx="1786580" cy="1843806"/>
+            <a:off x="3934214" y="1029024"/>
+            <a:ext cx="1347704" cy="1843806"/>
           </a:xfrm>
           <a:prstGeom prst="bentConnector2">
             <a:avLst/>
@@ -4702,8 +4640,8 @@
         </p:nvCxnSpPr>
         <p:spPr>
           <a:xfrm flipV="1">
-            <a:off x="3189651" y="2286000"/>
-            <a:ext cx="2340318" cy="518895"/>
+            <a:off x="3189651" y="1277075"/>
+            <a:ext cx="2340318" cy="151251"/>
           </a:xfrm>
           <a:prstGeom prst="bentConnector2">
             <a:avLst/>
@@ -4736,15 +4674,14 @@
         <p:nvCxnSpPr>
           <p:cNvPr id="91" name="Elbow Connector 63"/>
           <p:cNvCxnSpPr>
-            <a:stCxn id="16" idx="3"/>
-            <a:endCxn id="35" idx="3"/>
+            <a:cxnSpLocks/>
           </p:cNvCxnSpPr>
           <p:nvPr/>
         </p:nvCxnSpPr>
         <p:spPr>
           <a:xfrm rot="5400000">
-            <a:off x="3295676" y="2676487"/>
-            <a:ext cx="2624780" cy="1843807"/>
+            <a:off x="3515114" y="1448125"/>
+            <a:ext cx="2185904" cy="1843807"/>
           </a:xfrm>
           <a:prstGeom prst="bentConnector2">
             <a:avLst/>
@@ -4777,15 +4714,15 @@
         <p:nvCxnSpPr>
           <p:cNvPr id="94" name="Elbow Connector 63"/>
           <p:cNvCxnSpPr>
-            <a:stCxn id="16" idx="3"/>
+            <a:cxnSpLocks/>
             <a:endCxn id="38" idx="3"/>
           </p:cNvCxnSpPr>
           <p:nvPr/>
         </p:nvCxnSpPr>
         <p:spPr>
           <a:xfrm rot="5400000">
-            <a:off x="3143276" y="2828887"/>
-            <a:ext cx="2929580" cy="1843806"/>
+            <a:off x="3057914" y="2432542"/>
+            <a:ext cx="3100304" cy="1843806"/>
           </a:xfrm>
           <a:prstGeom prst="bentConnector2">
             <a:avLst/>
@@ -4824,7 +4761,7 @@
         </p:nvCxnSpPr>
         <p:spPr>
           <a:xfrm rot="5400000" flipH="1" flipV="1">
-            <a:off x="4594921" y="-525785"/>
+            <a:off x="4594921" y="-1363986"/>
             <a:ext cx="170724" cy="4081246"/>
           </a:xfrm>
           <a:prstGeom prst="bentConnector2">
@@ -4863,8 +4800,8 @@
         </p:nvSpPr>
         <p:spPr>
           <a:xfrm rot="16200000">
-            <a:off x="6213739" y="4484176"/>
-            <a:ext cx="1371599" cy="328045"/>
+            <a:off x="6099438" y="3760276"/>
+            <a:ext cx="1600203" cy="328045"/>
           </a:xfrm>
           <a:prstGeom prst="roundRect">
             <a:avLst/>
@@ -4923,7 +4860,7 @@
         </p:nvSpPr>
         <p:spPr>
           <a:xfrm rot="16200000">
-            <a:off x="956202" y="2861202"/>
+            <a:off x="956202" y="2023001"/>
             <a:ext cx="1093635" cy="346760"/>
           </a:xfrm>
           <a:prstGeom prst="rect">
@@ -4993,7 +4930,7 @@
         </p:nvSpPr>
         <p:spPr>
           <a:xfrm flipV="1">
-            <a:off x="1367767" y="2286001"/>
+            <a:off x="1367767" y="1447800"/>
             <a:ext cx="270504" cy="175523"/>
           </a:xfrm>
           <a:prstGeom prst="triangle">
@@ -5044,7 +4981,7 @@
         </p:nvCxnSpPr>
         <p:spPr>
           <a:xfrm rot="10800000" flipV="1">
-            <a:off x="1503020" y="1773579"/>
+            <a:off x="1503020" y="935378"/>
             <a:ext cx="589823" cy="512421"/>
           </a:xfrm>
           <a:prstGeom prst="bentConnector2">
@@ -5086,8 +5023,8 @@
         </p:nvCxnSpPr>
         <p:spPr>
           <a:xfrm rot="16200000" flipH="1">
-            <a:off x="2228948" y="3329727"/>
-            <a:ext cx="542277" cy="181427"/>
+            <a:off x="2259083" y="1912061"/>
+            <a:ext cx="482007" cy="181427"/>
           </a:xfrm>
           <a:prstGeom prst="bentConnector2">
             <a:avLst/>
@@ -5127,8 +5064,8 @@
         </p:nvCxnSpPr>
         <p:spPr>
           <a:xfrm rot="5400000">
-            <a:off x="4057676" y="1914487"/>
-            <a:ext cx="1100780" cy="1843806"/>
+            <a:off x="4277114" y="686124"/>
+            <a:ext cx="661904" cy="1843806"/>
           </a:xfrm>
           <a:prstGeom prst="bentConnector2">
             <a:avLst/>
@@ -5168,7 +5105,7 @@
         </p:nvCxnSpPr>
         <p:spPr>
           <a:xfrm rot="16200000" flipH="1">
-            <a:off x="3430123" y="4240513"/>
+            <a:off x="3430123" y="2792712"/>
             <a:ext cx="118421" cy="699979"/>
           </a:xfrm>
           <a:prstGeom prst="bentConnector2">
@@ -5209,8 +5146,8 @@
         </p:nvCxnSpPr>
         <p:spPr>
           <a:xfrm rot="5400000">
-            <a:off x="3544629" y="2427532"/>
-            <a:ext cx="2126873" cy="1843808"/>
+            <a:off x="3764067" y="1199169"/>
+            <a:ext cx="1687997" cy="1843808"/>
           </a:xfrm>
           <a:prstGeom prst="bentConnector2">
             <a:avLst/>
@@ -5247,7 +5184,7 @@
         </p:nvSpPr>
         <p:spPr>
           <a:xfrm>
-            <a:off x="5435896" y="2743200"/>
+            <a:off x="5435896" y="1295399"/>
             <a:ext cx="229325" cy="166560"/>
           </a:xfrm>
           <a:prstGeom prst="rect">
@@ -5300,7 +5237,7 @@
         </p:nvSpPr>
         <p:spPr>
           <a:xfrm>
-            <a:off x="3687515" y="3125361"/>
+            <a:off x="3687515" y="1677560"/>
             <a:ext cx="3048000" cy="203200"/>
           </a:xfrm>
           <a:custGeom>
@@ -5382,7 +5319,7 @@
         </p:nvSpPr>
         <p:spPr>
           <a:xfrm>
-            <a:off x="5431573" y="4488138"/>
+            <a:off x="5431573" y="3040337"/>
             <a:ext cx="229325" cy="160062"/>
           </a:xfrm>
           <a:prstGeom prst="rect">
@@ -5435,7 +5372,7 @@
         </p:nvSpPr>
         <p:spPr>
           <a:xfrm flipV="1">
-            <a:off x="4114799" y="4775200"/>
+            <a:off x="4114799" y="3327399"/>
             <a:ext cx="2642195" cy="101600"/>
           </a:xfrm>
           <a:custGeom>
@@ -5523,7 +5460,7 @@
         </p:nvSpPr>
         <p:spPr>
           <a:xfrm>
-            <a:off x="2092841" y="2134424"/>
+            <a:off x="2591662" y="4339409"/>
             <a:ext cx="1093635" cy="302608"/>
           </a:xfrm>
           <a:prstGeom prst="rect">
@@ -5577,48 +5514,569 @@
       </p:sp>
       <p:cxnSp>
         <p:nvCxnSpPr>
-          <p:cNvPr id="122" name="Elbow Connector 63">
+          <p:cNvPr id="45" name="Elbow Connector 63">
             <a:extLst>
               <a:ext uri="{FF2B5EF4-FFF2-40B4-BE49-F238E27FC236}">
-                <a16:creationId xmlns:a16="http://schemas.microsoft.com/office/drawing/2014/main" id="{146C8008-98B8-40C0-A90C-D37BA5F28E34}"/>
+                <a16:creationId xmlns:a16="http://schemas.microsoft.com/office/drawing/2014/main" id="{A830D251-9C15-4205-97AF-DCFF93ACE9B2}"/>
               </a:ext>
             </a:extLst>
           </p:cNvPr>
           <p:cNvCxnSpPr>
             <a:cxnSpLocks/>
-            <a:stCxn id="87" idx="2"/>
-            <a:endCxn id="2" idx="0"/>
+            <a:stCxn id="87" idx="3"/>
           </p:cNvCxnSpPr>
           <p:nvPr/>
         </p:nvCxnSpPr>
         <p:spPr>
-          <a:xfrm>
-            <a:off x="2639659" y="2437032"/>
-            <a:ext cx="3175" cy="215129"/>
-          </a:xfrm>
-          <a:prstGeom prst="straightConnector1">
+          <a:xfrm flipV="1">
+            <a:off x="3685297" y="1804293"/>
+            <a:ext cx="1844672" cy="2686420"/>
+          </a:xfrm>
+          <a:prstGeom prst="bentConnector2">
+            <a:avLst/>
+          </a:prstGeom>
+          <a:ln w="6350">
+            <a:solidFill>
+              <a:schemeClr val="accent3"/>
+            </a:solidFill>
+            <a:headEnd type="none" w="med" len="med"/>
+            <a:tailEnd type="none" w="med" len="med"/>
+          </a:ln>
+          <a:effectLst/>
+        </p:spPr>
+        <p:style>
+          <a:lnRef idx="1">
+            <a:schemeClr val="accent2"/>
+          </a:lnRef>
+          <a:fillRef idx="2">
+            <a:schemeClr val="accent2"/>
+          </a:fillRef>
+          <a:effectRef idx="1">
+            <a:schemeClr val="accent2"/>
+          </a:effectRef>
+          <a:fontRef idx="minor">
+            <a:schemeClr val="dk1"/>
+          </a:fontRef>
+        </p:style>
+      </p:cxnSp>
+      <p:cxnSp>
+        <p:nvCxnSpPr>
+          <p:cNvPr id="145" name="Elbow Connector 63">
+            <a:extLst>
+              <a:ext uri="{FF2B5EF4-FFF2-40B4-BE49-F238E27FC236}">
+                <a16:creationId xmlns:a16="http://schemas.microsoft.com/office/drawing/2014/main" id="{C67FEB08-4560-43D1-BE53-C70C88DDA5A5}"/>
+              </a:ext>
+            </a:extLst>
+          </p:cNvPr>
+          <p:cNvCxnSpPr>
+            <a:cxnSpLocks/>
+            <a:endCxn id="87" idx="1"/>
+          </p:cNvCxnSpPr>
+          <p:nvPr/>
+        </p:nvCxnSpPr>
+        <p:spPr>
+          <a:xfrm rot="16200000" flipH="1">
+            <a:off x="957417" y="2856467"/>
+            <a:ext cx="2909653" cy="358838"/>
+          </a:xfrm>
+          <a:prstGeom prst="bentConnector2">
             <a:avLst/>
           </a:prstGeom>
           <a:ln w="19050">
+            <a:solidFill>
+              <a:schemeClr val="accent3"/>
+            </a:solidFill>
             <a:headEnd type="none" w="med" len="med"/>
             <a:tailEnd type="arrow" w="med" len="med"/>
           </a:ln>
+          <a:effectLst/>
+        </p:spPr>
+        <p:style>
+          <a:lnRef idx="1">
+            <a:schemeClr val="accent2"/>
+          </a:lnRef>
+          <a:fillRef idx="2">
+            <a:schemeClr val="accent2"/>
+          </a:fillRef>
+          <a:effectRef idx="1">
+            <a:schemeClr val="accent2"/>
+          </a:effectRef>
+          <a:fontRef idx="minor">
+            <a:schemeClr val="dk1"/>
+          </a:fontRef>
+        </p:style>
+      </p:cxnSp>
+      <p:sp>
+        <p:nvSpPr>
+          <p:cNvPr id="166" name="Rectangle 11">
+            <a:extLst>
+              <a:ext uri="{FF2B5EF4-FFF2-40B4-BE49-F238E27FC236}">
+                <a16:creationId xmlns:a16="http://schemas.microsoft.com/office/drawing/2014/main" id="{985ED19D-0741-42AC-A1E5-7F9445F48F02}"/>
+              </a:ext>
+            </a:extLst>
+          </p:cNvPr>
+          <p:cNvSpPr/>
+          <p:nvPr/>
+        </p:nvSpPr>
+        <p:spPr>
+          <a:xfrm>
+            <a:off x="3849112" y="3585925"/>
+            <a:ext cx="1040906" cy="236841"/>
+          </a:xfrm>
+          <a:prstGeom prst="rect">
+            <a:avLst/>
+          </a:prstGeom>
+          <a:ln w="19050">
+            <a:solidFill>
+              <a:schemeClr val="accent3"/>
+            </a:solidFill>
+          </a:ln>
+          <a:effectLst/>
         </p:spPr>
         <p:style>
           <a:lnRef idx="1">
             <a:schemeClr val="accent3"/>
           </a:lnRef>
-          <a:fillRef idx="0">
+          <a:fillRef idx="2">
             <a:schemeClr val="accent3"/>
           </a:fillRef>
-          <a:effectRef idx="0">
+          <a:effectRef idx="1">
             <a:schemeClr val="accent3"/>
           </a:effectRef>
           <a:fontRef idx="minor">
-            <a:schemeClr val="tx1"/>
+            <a:schemeClr val="dk1"/>
+          </a:fontRef>
+        </p:style>
+        <p:txBody>
+          <a:bodyPr rtlCol="0" anchor="ctr"/>
+          <a:lstStyle/>
+          <a:p>
+            <a:pPr algn="ctr"/>
+            <a:r>
+              <a:rPr lang="en-US" sz="1050" b="1" dirty="0" err="1">
+                <a:solidFill>
+                  <a:schemeClr val="accent3">
+                    <a:lumMod val="75000"/>
+                  </a:schemeClr>
+                </a:solidFill>
+              </a:rPr>
+              <a:t>ServiceCard</a:t>
+            </a:r>
+            <a:endParaRPr lang="en-SG" sz="1050" b="1" dirty="0">
+              <a:solidFill>
+                <a:schemeClr val="accent3">
+                  <a:lumMod val="75000"/>
+                </a:schemeClr>
+              </a:solidFill>
+            </a:endParaRPr>
+          </a:p>
+        </p:txBody>
+      </p:sp>
+      <p:cxnSp>
+        <p:nvCxnSpPr>
+          <p:cNvPr id="174" name="Elbow Connector 63">
+            <a:extLst>
+              <a:ext uri="{FF2B5EF4-FFF2-40B4-BE49-F238E27FC236}">
+                <a16:creationId xmlns:a16="http://schemas.microsoft.com/office/drawing/2014/main" id="{C4EB0979-88FB-4F28-B42D-FB776B4F5754}"/>
+              </a:ext>
+            </a:extLst>
+          </p:cNvPr>
+          <p:cNvCxnSpPr>
+            <a:cxnSpLocks/>
+          </p:cNvCxnSpPr>
+          <p:nvPr/>
+        </p:nvCxnSpPr>
+        <p:spPr>
+          <a:xfrm rot="16200000" flipH="1">
+            <a:off x="1650349" y="2520800"/>
+            <a:ext cx="1701207" cy="183154"/>
+          </a:xfrm>
+          <a:prstGeom prst="bentConnector2">
+            <a:avLst/>
+          </a:prstGeom>
+          <a:ln w="19050">
+            <a:solidFill>
+              <a:schemeClr val="accent3"/>
+            </a:solidFill>
+            <a:headEnd type="none" w="med" len="med"/>
+            <a:tailEnd type="arrow" w="med" len="med"/>
+          </a:ln>
+          <a:effectLst/>
+        </p:spPr>
+        <p:style>
+          <a:lnRef idx="1">
+            <a:schemeClr val="accent2"/>
+          </a:lnRef>
+          <a:fillRef idx="2">
+            <a:schemeClr val="accent2"/>
+          </a:fillRef>
+          <a:effectRef idx="1">
+            <a:schemeClr val="accent2"/>
+          </a:effectRef>
+          <a:fontRef idx="minor">
+            <a:schemeClr val="dk1"/>
           </a:fontRef>
         </p:style>
       </p:cxnSp>
+      <p:cxnSp>
+        <p:nvCxnSpPr>
+          <p:cNvPr id="175" name="Elbow Connector 63">
+            <a:extLst>
+              <a:ext uri="{FF2B5EF4-FFF2-40B4-BE49-F238E27FC236}">
+                <a16:creationId xmlns:a16="http://schemas.microsoft.com/office/drawing/2014/main" id="{3A46EF24-822A-4823-8399-60895E97CD67}"/>
+              </a:ext>
+            </a:extLst>
+          </p:cNvPr>
+          <p:cNvCxnSpPr>
+            <a:cxnSpLocks/>
+          </p:cNvCxnSpPr>
+          <p:nvPr/>
+        </p:nvCxnSpPr>
+        <p:spPr>
+          <a:xfrm rot="5400000">
+            <a:off x="3514680" y="2239234"/>
+            <a:ext cx="2185904" cy="1843807"/>
+          </a:xfrm>
+          <a:prstGeom prst="bentConnector2">
+            <a:avLst/>
+          </a:prstGeom>
+          <a:ln w="6350">
+            <a:solidFill>
+              <a:schemeClr val="accent3"/>
+            </a:solidFill>
+            <a:headEnd type="none" w="med" len="med"/>
+            <a:tailEnd type="none" w="med" len="med"/>
+          </a:ln>
+          <a:effectLst/>
+        </p:spPr>
+        <p:style>
+          <a:lnRef idx="1">
+            <a:schemeClr val="accent2"/>
+          </a:lnRef>
+          <a:fillRef idx="2">
+            <a:schemeClr val="accent2"/>
+          </a:fillRef>
+          <a:effectRef idx="1">
+            <a:schemeClr val="accent2"/>
+          </a:effectRef>
+          <a:fontRef idx="minor">
+            <a:schemeClr val="dk1"/>
+          </a:fontRef>
+        </p:style>
+      </p:cxnSp>
+      <p:sp>
+        <p:nvSpPr>
+          <p:cNvPr id="176" name="Rectangle 11">
+            <a:extLst>
+              <a:ext uri="{FF2B5EF4-FFF2-40B4-BE49-F238E27FC236}">
+                <a16:creationId xmlns:a16="http://schemas.microsoft.com/office/drawing/2014/main" id="{1429F9BA-EF02-40AB-A3AE-C03E3A0C6D2F}"/>
+              </a:ext>
+            </a:extLst>
+          </p:cNvPr>
+          <p:cNvSpPr/>
+          <p:nvPr/>
+        </p:nvSpPr>
+        <p:spPr>
+          <a:xfrm>
+            <a:off x="2601382" y="3962400"/>
+            <a:ext cx="1093635" cy="236841"/>
+          </a:xfrm>
+          <a:prstGeom prst="rect">
+            <a:avLst/>
+          </a:prstGeom>
+          <a:ln w="19050">
+            <a:solidFill>
+              <a:schemeClr val="accent3"/>
+            </a:solidFill>
+          </a:ln>
+          <a:effectLst/>
+        </p:spPr>
+        <p:style>
+          <a:lnRef idx="1">
+            <a:schemeClr val="accent3"/>
+          </a:lnRef>
+          <a:fillRef idx="2">
+            <a:schemeClr val="accent3"/>
+          </a:fillRef>
+          <a:effectRef idx="1">
+            <a:schemeClr val="accent3"/>
+          </a:effectRef>
+          <a:fontRef idx="minor">
+            <a:schemeClr val="dk1"/>
+          </a:fontRef>
+        </p:style>
+        <p:txBody>
+          <a:bodyPr rtlCol="0" anchor="ctr"/>
+          <a:lstStyle/>
+          <a:p>
+            <a:pPr algn="ctr"/>
+            <a:r>
+              <a:rPr lang="en-US" sz="1050" b="1" dirty="0" err="1">
+                <a:solidFill>
+                  <a:schemeClr val="accent3">
+                    <a:lumMod val="75000"/>
+                  </a:schemeClr>
+                </a:solidFill>
+              </a:rPr>
+              <a:t>StatusBarFooter</a:t>
+            </a:r>
+            <a:endParaRPr lang="en-SG" sz="1050" b="1" dirty="0">
+              <a:solidFill>
+                <a:schemeClr val="accent3">
+                  <a:lumMod val="75000"/>
+                </a:schemeClr>
+              </a:solidFill>
+            </a:endParaRPr>
+          </a:p>
+        </p:txBody>
+      </p:sp>
+      <p:cxnSp>
+        <p:nvCxnSpPr>
+          <p:cNvPr id="177" name="Elbow Connector 63">
+            <a:extLst>
+              <a:ext uri="{FF2B5EF4-FFF2-40B4-BE49-F238E27FC236}">
+                <a16:creationId xmlns:a16="http://schemas.microsoft.com/office/drawing/2014/main" id="{E8075D1F-F851-44E6-81CA-2C7ACFF6A263}"/>
+              </a:ext>
+            </a:extLst>
+          </p:cNvPr>
+          <p:cNvCxnSpPr>
+            <a:cxnSpLocks/>
+            <a:endCxn id="176" idx="1"/>
+          </p:cNvCxnSpPr>
+          <p:nvPr/>
+        </p:nvCxnSpPr>
+        <p:spPr>
+          <a:xfrm rot="16200000" flipH="1">
+            <a:off x="2113804" y="3593243"/>
+            <a:ext cx="781716" cy="193439"/>
+          </a:xfrm>
+          <a:prstGeom prst="bentConnector2">
+            <a:avLst/>
+          </a:prstGeom>
+          <a:ln w="19050">
+            <a:solidFill>
+              <a:schemeClr val="accent3"/>
+            </a:solidFill>
+            <a:headEnd type="none" w="med" len="med"/>
+            <a:tailEnd type="arrow" w="med" len="med"/>
+          </a:ln>
+          <a:effectLst/>
+        </p:spPr>
+        <p:style>
+          <a:lnRef idx="1">
+            <a:schemeClr val="accent2"/>
+          </a:lnRef>
+          <a:fillRef idx="2">
+            <a:schemeClr val="accent2"/>
+          </a:fillRef>
+          <a:effectRef idx="1">
+            <a:schemeClr val="accent2"/>
+          </a:effectRef>
+          <a:fontRef idx="minor">
+            <a:schemeClr val="dk1"/>
+          </a:fontRef>
+        </p:style>
+      </p:cxnSp>
+      <p:sp>
+        <p:nvSpPr>
+          <p:cNvPr id="193" name="Rectangle 11">
+            <a:extLst>
+              <a:ext uri="{FF2B5EF4-FFF2-40B4-BE49-F238E27FC236}">
+                <a16:creationId xmlns:a16="http://schemas.microsoft.com/office/drawing/2014/main" id="{94EF6563-4BB3-4A5F-99FA-0F7DFB5E5091}"/>
+              </a:ext>
+            </a:extLst>
+          </p:cNvPr>
+          <p:cNvSpPr/>
+          <p:nvPr/>
+        </p:nvSpPr>
+        <p:spPr>
+          <a:xfrm>
+            <a:off x="2597421" y="3352800"/>
+            <a:ext cx="1093635" cy="236841"/>
+          </a:xfrm>
+          <a:prstGeom prst="rect">
+            <a:avLst/>
+          </a:prstGeom>
+          <a:ln w="19050">
+            <a:solidFill>
+              <a:schemeClr val="accent3"/>
+            </a:solidFill>
+          </a:ln>
+          <a:effectLst/>
+        </p:spPr>
+        <p:style>
+          <a:lnRef idx="1">
+            <a:schemeClr val="accent3"/>
+          </a:lnRef>
+          <a:fillRef idx="2">
+            <a:schemeClr val="accent3"/>
+          </a:fillRef>
+          <a:effectRef idx="1">
+            <a:schemeClr val="accent3"/>
+          </a:effectRef>
+          <a:fontRef idx="minor">
+            <a:schemeClr val="dk1"/>
+          </a:fontRef>
+        </p:style>
+        <p:txBody>
+          <a:bodyPr rtlCol="0" anchor="ctr"/>
+          <a:lstStyle/>
+          <a:p>
+            <a:pPr algn="ctr"/>
+            <a:r>
+              <a:rPr lang="en-US" sz="1050" b="1" dirty="0" err="1">
+                <a:solidFill>
+                  <a:schemeClr val="accent3">
+                    <a:lumMod val="75000"/>
+                  </a:schemeClr>
+                </a:solidFill>
+              </a:rPr>
+              <a:t>ServiceListPanel</a:t>
+            </a:r>
+            <a:endParaRPr lang="en-SG" sz="1050" b="1" dirty="0">
+              <a:solidFill>
+                <a:schemeClr val="accent3">
+                  <a:lumMod val="75000"/>
+                </a:schemeClr>
+              </a:solidFill>
+            </a:endParaRPr>
+          </a:p>
+        </p:txBody>
+      </p:sp>
+      <p:cxnSp>
+        <p:nvCxnSpPr>
+          <p:cNvPr id="194" name="Elbow Connector 136">
+            <a:extLst>
+              <a:ext uri="{FF2B5EF4-FFF2-40B4-BE49-F238E27FC236}">
+                <a16:creationId xmlns:a16="http://schemas.microsoft.com/office/drawing/2014/main" id="{D45ACFA5-AF27-4651-9F4A-5A99A241892D}"/>
+              </a:ext>
+            </a:extLst>
+          </p:cNvPr>
+          <p:cNvCxnSpPr>
+            <a:stCxn id="193" idx="2"/>
+          </p:cNvCxnSpPr>
+          <p:nvPr/>
+        </p:nvCxnSpPr>
+        <p:spPr>
+          <a:xfrm rot="16200000" flipH="1">
+            <a:off x="3435018" y="3298861"/>
+            <a:ext cx="118421" cy="699979"/>
+          </a:xfrm>
+          <a:prstGeom prst="bentConnector2">
+            <a:avLst/>
+          </a:prstGeom>
+          <a:ln w="19050">
+            <a:solidFill>
+              <a:schemeClr val="accent3"/>
+            </a:solidFill>
+            <a:headEnd type="none" w="med" len="med"/>
+            <a:tailEnd type="arrow" w="med" len="med"/>
+          </a:ln>
+          <a:effectLst/>
+        </p:spPr>
+        <p:style>
+          <a:lnRef idx="1">
+            <a:schemeClr val="accent2"/>
+          </a:lnRef>
+          <a:fillRef idx="2">
+            <a:schemeClr val="accent2"/>
+          </a:fillRef>
+          <a:effectRef idx="1">
+            <a:schemeClr val="accent2"/>
+          </a:effectRef>
+          <a:fontRef idx="minor">
+            <a:schemeClr val="dk1"/>
+          </a:fontRef>
+        </p:style>
+      </p:cxnSp>
+      <p:sp>
+        <p:nvSpPr>
+          <p:cNvPr id="195" name="Freeform 117">
+            <a:extLst>
+              <a:ext uri="{FF2B5EF4-FFF2-40B4-BE49-F238E27FC236}">
+                <a16:creationId xmlns:a16="http://schemas.microsoft.com/office/drawing/2014/main" id="{E7942259-0B47-4EC5-8C09-CF0641F6F8A3}"/>
+              </a:ext>
+            </a:extLst>
+          </p:cNvPr>
+          <p:cNvSpPr/>
+          <p:nvPr/>
+        </p:nvSpPr>
+        <p:spPr>
+          <a:xfrm flipV="1">
+            <a:off x="4110475" y="3839586"/>
+            <a:ext cx="2642195" cy="101600"/>
+          </a:xfrm>
+          <a:custGeom>
+            <a:avLst/>
+            <a:gdLst>
+              <a:gd name="connsiteX0" fmla="*/ 0 w 3048000"/>
+              <a:gd name="connsiteY0" fmla="*/ 203200 h 203200"/>
+              <a:gd name="connsiteX1" fmla="*/ 221673 w 3048000"/>
+              <a:gd name="connsiteY1" fmla="*/ 0 h 203200"/>
+              <a:gd name="connsiteX2" fmla="*/ 3048000 w 3048000"/>
+              <a:gd name="connsiteY2" fmla="*/ 0 h 203200"/>
+            </a:gdLst>
+            <a:ahLst/>
+            <a:cxnLst>
+              <a:cxn ang="0">
+                <a:pos x="connsiteX0" y="connsiteY0"/>
+              </a:cxn>
+              <a:cxn ang="0">
+                <a:pos x="connsiteX1" y="connsiteY1"/>
+              </a:cxn>
+              <a:cxn ang="0">
+                <a:pos x="connsiteX2" y="connsiteY2"/>
+              </a:cxn>
+            </a:cxnLst>
+            <a:rect l="l" t="t" r="r" b="b"/>
+            <a:pathLst>
+              <a:path w="3048000" h="203200">
+                <a:moveTo>
+                  <a:pt x="0" y="203200"/>
+                </a:moveTo>
+                <a:lnTo>
+                  <a:pt x="221673" y="0"/>
+                </a:lnTo>
+                <a:lnTo>
+                  <a:pt x="3048000" y="0"/>
+                </a:lnTo>
+              </a:path>
+            </a:pathLst>
+          </a:custGeom>
+          <a:noFill/>
+          <a:ln w="19050">
+            <a:solidFill>
+              <a:schemeClr val="accent3"/>
+            </a:solidFill>
+            <a:prstDash val="sysDot"/>
+            <a:headEnd type="none" w="med" len="med"/>
+            <a:tailEnd type="arrow" w="med" len="med"/>
+          </a:ln>
+          <a:effectLst/>
+        </p:spPr>
+        <p:style>
+          <a:lnRef idx="1">
+            <a:schemeClr val="accent2"/>
+          </a:lnRef>
+          <a:fillRef idx="2">
+            <a:schemeClr val="accent2"/>
+          </a:fillRef>
+          <a:effectRef idx="1">
+            <a:schemeClr val="accent2"/>
+          </a:effectRef>
+          <a:fontRef idx="minor">
+            <a:schemeClr val="dk1"/>
+          </a:fontRef>
+        </p:style>
+        <p:txBody>
+          <a:bodyPr rtlCol="0" anchor="ctr"/>
+          <a:lstStyle/>
+          <a:p>
+            <a:pPr algn="ctr"/>
+            <a:endParaRPr lang="en-SG"/>
+          </a:p>
+        </p:txBody>
+      </p:sp>
     </p:spTree>
     <p:extLst>
       <p:ext uri="{BB962C8B-B14F-4D97-AF65-F5344CB8AC3E}">

</xml_diff>